<commit_message>
#50 fixed signIn signOut, not manage go forward and go back on browser yet, change Navbar name to fake name
</commit_message>
<xml_diff>
--- a/docs/ER-DIAGRAM.pptx
+++ b/docs/ER-DIAGRAM.pptx
@@ -242,7 +242,7 @@
           <a:p>
             <a:fld id="{28BE630F-C39C-4DB9-8258-0B48CA067079}" type="datetimeFigureOut">
               <a:rPr lang="en-US" smtClean="0"/>
-              <a:t>11/25/2021</a:t>
+              <a:t>12/3/2021</a:t>
             </a:fld>
             <a:endParaRPr lang="en-US"/>
           </a:p>
@@ -410,7 +410,7 @@
           <a:p>
             <a:fld id="{28BE630F-C39C-4DB9-8258-0B48CA067079}" type="datetimeFigureOut">
               <a:rPr lang="en-US" smtClean="0"/>
-              <a:t>11/25/2021</a:t>
+              <a:t>12/3/2021</a:t>
             </a:fld>
             <a:endParaRPr lang="en-US"/>
           </a:p>
@@ -588,7 +588,7 @@
           <a:p>
             <a:fld id="{28BE630F-C39C-4DB9-8258-0B48CA067079}" type="datetimeFigureOut">
               <a:rPr lang="en-US" smtClean="0"/>
-              <a:t>11/25/2021</a:t>
+              <a:t>12/3/2021</a:t>
             </a:fld>
             <a:endParaRPr lang="en-US"/>
           </a:p>
@@ -756,7 +756,7 @@
           <a:p>
             <a:fld id="{28BE630F-C39C-4DB9-8258-0B48CA067079}" type="datetimeFigureOut">
               <a:rPr lang="en-US" smtClean="0"/>
-              <a:t>11/25/2021</a:t>
+              <a:t>12/3/2021</a:t>
             </a:fld>
             <a:endParaRPr lang="en-US"/>
           </a:p>
@@ -1001,7 +1001,7 @@
           <a:p>
             <a:fld id="{28BE630F-C39C-4DB9-8258-0B48CA067079}" type="datetimeFigureOut">
               <a:rPr lang="en-US" smtClean="0"/>
-              <a:t>11/25/2021</a:t>
+              <a:t>12/3/2021</a:t>
             </a:fld>
             <a:endParaRPr lang="en-US"/>
           </a:p>
@@ -1230,7 +1230,7 @@
           <a:p>
             <a:fld id="{28BE630F-C39C-4DB9-8258-0B48CA067079}" type="datetimeFigureOut">
               <a:rPr lang="en-US" smtClean="0"/>
-              <a:t>11/25/2021</a:t>
+              <a:t>12/3/2021</a:t>
             </a:fld>
             <a:endParaRPr lang="en-US"/>
           </a:p>
@@ -1594,7 +1594,7 @@
           <a:p>
             <a:fld id="{28BE630F-C39C-4DB9-8258-0B48CA067079}" type="datetimeFigureOut">
               <a:rPr lang="en-US" smtClean="0"/>
-              <a:t>11/25/2021</a:t>
+              <a:t>12/3/2021</a:t>
             </a:fld>
             <a:endParaRPr lang="en-US"/>
           </a:p>
@@ -1711,7 +1711,7 @@
           <a:p>
             <a:fld id="{28BE630F-C39C-4DB9-8258-0B48CA067079}" type="datetimeFigureOut">
               <a:rPr lang="en-US" smtClean="0"/>
-              <a:t>11/25/2021</a:t>
+              <a:t>12/3/2021</a:t>
             </a:fld>
             <a:endParaRPr lang="en-US"/>
           </a:p>
@@ -1806,7 +1806,7 @@
           <a:p>
             <a:fld id="{28BE630F-C39C-4DB9-8258-0B48CA067079}" type="datetimeFigureOut">
               <a:rPr lang="en-US" smtClean="0"/>
-              <a:t>11/25/2021</a:t>
+              <a:t>12/3/2021</a:t>
             </a:fld>
             <a:endParaRPr lang="en-US"/>
           </a:p>
@@ -2081,7 +2081,7 @@
           <a:p>
             <a:fld id="{28BE630F-C39C-4DB9-8258-0B48CA067079}" type="datetimeFigureOut">
               <a:rPr lang="en-US" smtClean="0"/>
-              <a:t>11/25/2021</a:t>
+              <a:t>12/3/2021</a:t>
             </a:fld>
             <a:endParaRPr lang="en-US"/>
           </a:p>
@@ -2333,7 +2333,7 @@
           <a:p>
             <a:fld id="{28BE630F-C39C-4DB9-8258-0B48CA067079}" type="datetimeFigureOut">
               <a:rPr lang="en-US" smtClean="0"/>
-              <a:t>11/25/2021</a:t>
+              <a:t>12/3/2021</a:t>
             </a:fld>
             <a:endParaRPr lang="en-US"/>
           </a:p>
@@ -2544,7 +2544,7 @@
           <a:p>
             <a:fld id="{28BE630F-C39C-4DB9-8258-0B48CA067079}" type="datetimeFigureOut">
               <a:rPr lang="en-US" smtClean="0"/>
-              <a:t>11/25/2021</a:t>
+              <a:t>12/3/2021</a:t>
             </a:fld>
             <a:endParaRPr lang="en-US"/>
           </a:p>
@@ -4162,7 +4162,7 @@
           <p:nvPr>
             <p:extLst>
               <p:ext uri="{D42A27DB-BD31-4B8C-83A1-F6EECF244321}">
-                <p14:modId xmlns:p14="http://schemas.microsoft.com/office/powerpoint/2010/main" val="285911591"/>
+                <p14:modId xmlns:p14="http://schemas.microsoft.com/office/powerpoint/2010/main" val="1370035748"/>
               </p:ext>
             </p:extLst>
           </p:nvPr>
@@ -4209,7 +4209,7 @@
                       <a:pPr algn="ctr"/>
                       <a:r>
                         <a:rPr lang="en-US" dirty="0"/>
-                        <a:t>JOIN</a:t>
+                        <a:t>USER_JOIN_EVENT</a:t>
                       </a:r>
                     </a:p>
                   </a:txBody>
@@ -4688,7 +4688,7 @@
           <a:p>
             <a:r>
               <a:rPr lang="en-US" dirty="0"/>
-              <a:t>1</a:t>
+              <a:t>*</a:t>
             </a:r>
           </a:p>
         </p:txBody>

</xml_diff>